<commit_message>
space for unresolved folders
</commit_message>
<xml_diff>
--- a/Prezantasyon/Gitn_Pro_HTML_CSS.pptx
+++ b/Prezantasyon/Gitn_Pro_HTML_CSS.pptx
@@ -916,7 +916,7 @@
           </a:ln>
           <a:extLst>
             <a:ext uri="{C572A759-6A51-4108-AA02-DFA0A04FC94B}">
-              <ma14:wrappingTextBoxFlag xmlns:ma14="http://schemas.microsoft.com/office/mac/drawingml/2011/main" xmlns="" val="1"/>
+              <ma14:wrappingTextBoxFlag xmlns="" xmlns:ma14="http://schemas.microsoft.com/office/mac/drawingml/2011/main" val="1"/>
             </a:ext>
           </a:extLst>
         </p:spPr>
@@ -1046,7 +1046,7 @@
           </a:ln>
           <a:extLst>
             <a:ext uri="{C572A759-6A51-4108-AA02-DFA0A04FC94B}">
-              <ma14:wrappingTextBoxFlag xmlns:ma14="http://schemas.microsoft.com/office/mac/drawingml/2011/main" xmlns="" val="1"/>
+              <ma14:wrappingTextBoxFlag xmlns="" xmlns:ma14="http://schemas.microsoft.com/office/mac/drawingml/2011/main" val="1"/>
             </a:ext>
           </a:extLst>
         </p:spPr>
@@ -1085,7 +1085,7 @@
           </a:ln>
           <a:extLst>
             <a:ext uri="{C572A759-6A51-4108-AA02-DFA0A04FC94B}">
-              <ma14:wrappingTextBoxFlag xmlns:ma14="http://schemas.microsoft.com/office/mac/drawingml/2011/main" xmlns="" val="1"/>
+              <ma14:wrappingTextBoxFlag xmlns="" xmlns:ma14="http://schemas.microsoft.com/office/mac/drawingml/2011/main" val="1"/>
             </a:ext>
           </a:extLst>
         </p:spPr>
@@ -2026,7 +2026,7 @@
         <p:spPr>
           <a:xfrm>
             <a:off x="98425" y="1066800"/>
-            <a:ext cx="8947150" cy="3299570"/>
+            <a:ext cx="8947150" cy="1985124"/>
           </a:xfrm>
           <a:prstGeom prst="rect">
             <a:avLst/>
@@ -2036,7 +2036,7 @@
           </a:ln>
           <a:extLst>
             <a:ext uri="{C572A759-6A51-4108-AA02-DFA0A04FC94B}">
-              <ma14:wrappingTextBoxFlag xmlns:ma14="http://schemas.microsoft.com/office/mac/drawingml/2011/main" xmlns="" val="1"/>
+              <ma14:wrappingTextBoxFlag xmlns="" xmlns:ma14="http://schemas.microsoft.com/office/mac/drawingml/2011/main" val="1"/>
             </a:ext>
           </a:extLst>
         </p:spPr>
@@ -2061,9 +2061,34 @@
               </a:defRPr>
             </a:pPr>
             <a:r>
-              <a:t>Students will understand the importance of Git Version Control and of how to use it.</a:t>
-            </a:r>
-            <a:endParaRPr sz="2400"/>
+              <a:rPr lang="en-US" dirty="0" err="1"/>
+              <a:t>Etidyan</a:t>
+            </a:r>
+            <a:r>
+              <a:rPr lang="en-US" dirty="0"/>
+              <a:t> dye </a:t>
+            </a:r>
+            <a:r>
+              <a:rPr lang="en-US" dirty="0" err="1"/>
+              <a:t>pratike</a:t>
+            </a:r>
+            <a:r>
+              <a:rPr lang="en-US" dirty="0"/>
+              <a:t> </a:t>
+            </a:r>
+            <a:r>
+              <a:rPr lang="en-US" dirty="0" err="1"/>
+              <a:t>anpil</a:t>
+            </a:r>
+            <a:r>
+              <a:rPr lang="en-US" dirty="0"/>
+              <a:t> HTML</a:t>
+            </a:r>
+            <a:r>
+              <a:rPr dirty="0"/>
+              <a:t>.</a:t>
+            </a:r>
+            <a:endParaRPr sz="2400" dirty="0"/>
           </a:p>
           <a:p>
             <a:pPr marL="257175" indent="-257175" defTabSz="685800">
@@ -2080,7 +2105,7 @@
                 <a:sym typeface="Arial"/>
               </a:defRPr>
             </a:pPr>
-            <a:endParaRPr sz="2400"/>
+            <a:endParaRPr sz="2400" dirty="0"/>
           </a:p>
           <a:p>
             <a:pPr marL="257175" indent="-257175" defTabSz="685800">
@@ -2098,9 +2123,54 @@
               </a:defRPr>
             </a:pPr>
             <a:r>
-              <a:t>Students will create GitHub Repositories, push code into them, and share with class.</a:t>
-            </a:r>
-            <a:endParaRPr sz="2400"/>
+              <a:rPr lang="en-US" dirty="0" err="1"/>
+              <a:t>Edityan</a:t>
+            </a:r>
+            <a:r>
+              <a:rPr lang="en-US" dirty="0"/>
+              <a:t> </a:t>
+            </a:r>
+            <a:r>
+              <a:rPr lang="en-US" dirty="0" err="1"/>
+              <a:t>pral</a:t>
+            </a:r>
+            <a:r>
+              <a:rPr lang="en-US" dirty="0"/>
+              <a:t> </a:t>
+            </a:r>
+            <a:r>
+              <a:rPr lang="en-US" dirty="0" err="1"/>
+              <a:t>koman</a:t>
+            </a:r>
+            <a:r>
+              <a:rPr lang="en-US" dirty="0"/>
+              <a:t> </a:t>
+            </a:r>
+            <a:r>
+              <a:rPr lang="en-US" dirty="0" err="1"/>
+              <a:t>pou’l</a:t>
+            </a:r>
+            <a:r>
+              <a:rPr lang="en-US" dirty="0"/>
+              <a:t> </a:t>
+            </a:r>
+            <a:r>
+              <a:rPr lang="en-US" dirty="0" err="1"/>
+              <a:t>itilize</a:t>
+            </a:r>
+            <a:r>
+              <a:rPr lang="en-US" dirty="0"/>
+              <a:t> yon </a:t>
+            </a:r>
+            <a:r>
+              <a:rPr lang="en-US" dirty="0" err="1"/>
+              <a:t>senp</a:t>
+            </a:r>
+            <a:r>
+              <a:rPr lang="en-US"/>
+              <a:t> tag.</a:t>
+            </a:r>
+            <a:endParaRPr sz="2400" dirty="0"/>
           </a:p>
           <a:p>
             <a:pPr marL="257175" indent="-257175" defTabSz="685800">
@@ -2117,7 +2187,7 @@
                 <a:sym typeface="Arial"/>
               </a:defRPr>
             </a:pPr>
-            <a:endParaRPr sz="2400"/>
+            <a:endParaRPr sz="2400" dirty="0"/>
           </a:p>
           <a:p>
             <a:pPr marL="257175" indent="-257175" defTabSz="685800">
@@ -2135,80 +2205,7 @@
               </a:defRPr>
             </a:pPr>
             <a:r>
-              <a:t>Students will make more HTML documents.</a:t>
-            </a:r>
-            <a:endParaRPr sz="2400"/>
-          </a:p>
-          <a:p>
-            <a:pPr marL="257175" indent="-257175" defTabSz="685800">
-              <a:spcBef>
-                <a:spcPts val="500"/>
-              </a:spcBef>
-              <a:buSzPct val="100000"/>
-              <a:buFont typeface="Arial"/>
-              <a:buChar char="•"/>
-              <a:defRPr>
-                <a:latin typeface="Arial"/>
-                <a:ea typeface="Arial"/>
-                <a:cs typeface="Arial"/>
-                <a:sym typeface="Arial"/>
-              </a:defRPr>
-            </a:pPr>
-            <a:endParaRPr sz="2400"/>
-          </a:p>
-          <a:p>
-            <a:pPr marL="257175" indent="-257175" defTabSz="685800">
-              <a:spcBef>
-                <a:spcPts val="400"/>
-              </a:spcBef>
-              <a:buSzPct val="100000"/>
-              <a:buFont typeface="Arial"/>
-              <a:buChar char="•"/>
-              <a:defRPr>
-                <a:latin typeface="Arial"/>
-                <a:ea typeface="Arial"/>
-                <a:cs typeface="Arial"/>
-                <a:sym typeface="Arial"/>
-              </a:defRPr>
-            </a:pPr>
-            <a:r>
-              <a:t>Students will learn to properly use basic HTML tags.</a:t>
-            </a:r>
-            <a:endParaRPr sz="2400"/>
-          </a:p>
-          <a:p>
-            <a:pPr marL="257175" indent="-257175" defTabSz="685800">
-              <a:spcBef>
-                <a:spcPts val="500"/>
-              </a:spcBef>
-              <a:buSzPct val="100000"/>
-              <a:buFont typeface="Arial"/>
-              <a:buChar char="•"/>
-              <a:defRPr>
-                <a:latin typeface="Arial"/>
-                <a:ea typeface="Arial"/>
-                <a:cs typeface="Arial"/>
-                <a:sym typeface="Arial"/>
-              </a:defRPr>
-            </a:pPr>
-            <a:endParaRPr sz="2400"/>
-          </a:p>
-          <a:p>
-            <a:pPr marL="257175" indent="-257175" defTabSz="685800">
-              <a:spcBef>
-                <a:spcPts val="400"/>
-              </a:spcBef>
-              <a:buSzPct val="100000"/>
-              <a:buFont typeface="Arial"/>
-              <a:buChar char="•"/>
-              <a:defRPr>
-                <a:latin typeface="Arial"/>
-                <a:ea typeface="Arial"/>
-                <a:cs typeface="Arial"/>
-                <a:sym typeface="Arial"/>
-              </a:defRPr>
-            </a:pPr>
-            <a:r>
+              <a:rPr dirty="0"/>
               <a:t>Students will implement basic CSS styling to HTML documents. </a:t>
             </a:r>
           </a:p>
@@ -2328,7 +2325,7 @@
           </a:ln>
           <a:extLst>
             <a:ext uri="{C572A759-6A51-4108-AA02-DFA0A04FC94B}">
-              <ma14:wrappingTextBoxFlag xmlns:ma14="http://schemas.microsoft.com/office/mac/drawingml/2011/main" xmlns="" val="1"/>
+              <ma14:wrappingTextBoxFlag xmlns="" xmlns:ma14="http://schemas.microsoft.com/office/mac/drawingml/2011/main" val="1"/>
             </a:ext>
           </a:extLst>
         </p:spPr>
@@ -2540,7 +2537,7 @@
           </a:ln>
           <a:extLst>
             <a:ext uri="{C572A759-6A51-4108-AA02-DFA0A04FC94B}">
-              <ma14:wrappingTextBoxFlag xmlns:ma14="http://schemas.microsoft.com/office/mac/drawingml/2011/main" xmlns="" val="1"/>
+              <ma14:wrappingTextBoxFlag xmlns="" xmlns:ma14="http://schemas.microsoft.com/office/mac/drawingml/2011/main" val="1"/>
             </a:ext>
           </a:extLst>
         </p:spPr>
@@ -2631,7 +2628,7 @@
           </a:ln>
           <a:extLst>
             <a:ext uri="{C572A759-6A51-4108-AA02-DFA0A04FC94B}">
-              <ma14:wrappingTextBoxFlag xmlns:ma14="http://schemas.microsoft.com/office/mac/drawingml/2011/main" xmlns="" val="1"/>
+              <ma14:wrappingTextBoxFlag xmlns="" xmlns:ma14="http://schemas.microsoft.com/office/mac/drawingml/2011/main" val="1"/>
             </a:ext>
           </a:extLst>
         </p:spPr>
@@ -2960,7 +2957,7 @@
           </a:ln>
           <a:extLst>
             <a:ext uri="{C572A759-6A51-4108-AA02-DFA0A04FC94B}">
-              <ma14:wrappingTextBoxFlag xmlns:ma14="http://schemas.microsoft.com/office/mac/drawingml/2011/main" xmlns="" val="1"/>
+              <ma14:wrappingTextBoxFlag xmlns="" xmlns:ma14="http://schemas.microsoft.com/office/mac/drawingml/2011/main" val="1"/>
             </a:ext>
           </a:extLst>
         </p:spPr>
@@ -3223,7 +3220,7 @@
           </a:ln>
           <a:extLst>
             <a:ext uri="{C572A759-6A51-4108-AA02-DFA0A04FC94B}">
-              <ma14:wrappingTextBoxFlag xmlns:ma14="http://schemas.microsoft.com/office/mac/drawingml/2011/main" xmlns="" val="1"/>
+              <ma14:wrappingTextBoxFlag xmlns="" xmlns:ma14="http://schemas.microsoft.com/office/mac/drawingml/2011/main" val="1"/>
             </a:ext>
           </a:extLst>
         </p:spPr>
@@ -3245,6 +3242,7 @@
               </a:defRPr>
             </a:pPr>
             <a:r>
+              <a:rPr dirty="0"/>
               <a:t>HTML Alone</a:t>
             </a:r>
           </a:p>
@@ -3264,6 +3262,7 @@
               </a:defRPr>
             </a:pPr>
             <a:r>
+              <a:rPr dirty="0"/>
               <a:t>Like writing papers in “Notepad.” </a:t>
             </a:r>
           </a:p>
@@ -3282,7 +3281,7 @@
                 <a:sym typeface="Arial"/>
               </a:defRPr>
             </a:pPr>
-            <a:endParaRPr/>
+            <a:endParaRPr dirty="0"/>
           </a:p>
           <a:p>
             <a:pPr marL="257175" indent="-257175" algn="ctr" defTabSz="685800">
@@ -3300,6 +3299,7 @@
               </a:defRPr>
             </a:pPr>
             <a:r>
+              <a:rPr dirty="0"/>
               <a:t>Can only write unformatted text. </a:t>
             </a:r>
           </a:p>
@@ -3324,7 +3324,7 @@
           </a:ln>
           <a:extLst>
             <a:ext uri="{C572A759-6A51-4108-AA02-DFA0A04FC94B}">
-              <ma14:wrappingTextBoxFlag xmlns:ma14="http://schemas.microsoft.com/office/mac/drawingml/2011/main" xmlns="" val="1"/>
+              <ma14:wrappingTextBoxFlag xmlns="" xmlns:ma14="http://schemas.microsoft.com/office/mac/drawingml/2011/main" val="1"/>
             </a:ext>
           </a:extLst>
         </p:spPr>
@@ -3806,7 +3806,7 @@
           </a:ln>
           <a:extLst>
             <a:ext uri="{C572A759-6A51-4108-AA02-DFA0A04FC94B}">
-              <ma14:wrappingTextBoxFlag xmlns:ma14="http://schemas.microsoft.com/office/mac/drawingml/2011/main" xmlns="" val="1"/>
+              <ma14:wrappingTextBoxFlag xmlns="" xmlns:ma14="http://schemas.microsoft.com/office/mac/drawingml/2011/main" val="1"/>
             </a:ext>
           </a:extLst>
         </p:spPr>
@@ -4206,7 +4206,7 @@
           </a:ln>
           <a:extLst>
             <a:ext uri="{C572A759-6A51-4108-AA02-DFA0A04FC94B}">
-              <ma14:wrappingTextBoxFlag xmlns:ma14="http://schemas.microsoft.com/office/mac/drawingml/2011/main" xmlns="" val="1"/>
+              <ma14:wrappingTextBoxFlag xmlns="" xmlns:ma14="http://schemas.microsoft.com/office/mac/drawingml/2011/main" val="1"/>
             </a:ext>
           </a:extLst>
         </p:spPr>
@@ -4231,27 +4231,30 @@
               </a:defRPr>
             </a:pPr>
             <a:r>
+              <a:rPr dirty="0"/>
               <a:t>CSS works by hooking onto </a:t>
             </a:r>
             <a:r>
-              <a:rPr b="1"/>
+              <a:rPr b="1" dirty="0"/>
               <a:t>selectors</a:t>
             </a:r>
             <a:r>
+              <a:rPr dirty="0"/>
               <a:t> added into HTML using </a:t>
             </a:r>
             <a:r>
-              <a:rPr b="1"/>
+              <a:rPr b="1" dirty="0"/>
               <a:t>classes</a:t>
             </a:r>
             <a:r>
+              <a:rPr dirty="0"/>
               <a:t> and </a:t>
             </a:r>
             <a:r>
-              <a:rPr b="1"/>
+              <a:rPr b="1" dirty="0"/>
               <a:t>identifiers.</a:t>
             </a:r>
-            <a:endParaRPr sz="2400"/>
+            <a:endParaRPr sz="2400" dirty="0"/>
           </a:p>
           <a:p>
             <a:pPr marL="257175" indent="-257175" defTabSz="685800">
@@ -4268,7 +4271,7 @@
                 <a:sym typeface="Arial"/>
               </a:defRPr>
             </a:pPr>
-            <a:endParaRPr sz="2400"/>
+            <a:endParaRPr sz="2400" dirty="0"/>
           </a:p>
           <a:p>
             <a:pPr marL="257175" indent="-257175" defTabSz="685800">
@@ -4286,16 +4289,18 @@
               </a:defRPr>
             </a:pPr>
             <a:r>
+              <a:rPr dirty="0"/>
               <a:t>Once hooked, we apply </a:t>
             </a:r>
             <a:r>
-              <a:rPr b="1"/>
+              <a:rPr b="1" dirty="0"/>
               <a:t>styles </a:t>
             </a:r>
             <a:r>
+              <a:rPr dirty="0"/>
               <a:t>to those HTML elements using CSS.</a:t>
             </a:r>
-            <a:endParaRPr sz="2400"/>
+            <a:endParaRPr sz="2400" dirty="0"/>
           </a:p>
           <a:p>
             <a:pPr marL="257175" indent="-257175" defTabSz="685800">
@@ -4312,7 +4317,7 @@
                 <a:sym typeface="Arial"/>
               </a:defRPr>
             </a:pPr>
-            <a:endParaRPr sz="2400"/>
+            <a:endParaRPr sz="2400" dirty="0"/>
           </a:p>
           <a:p>
             <a:pPr defTabSz="685800">
@@ -4326,7 +4331,7 @@
                 <a:sym typeface="Arial"/>
               </a:defRPr>
             </a:pPr>
-            <a:endParaRPr sz="2400"/>
+            <a:endParaRPr sz="2400" dirty="0"/>
           </a:p>
         </p:txBody>
       </p:sp>
@@ -4446,7 +4451,7 @@
           </a:ln>
           <a:extLst>
             <a:ext uri="{C572A759-6A51-4108-AA02-DFA0A04FC94B}">
-              <ma14:wrappingTextBoxFlag xmlns:ma14="http://schemas.microsoft.com/office/mac/drawingml/2011/main" xmlns="" val="1"/>
+              <ma14:wrappingTextBoxFlag xmlns="" xmlns:ma14="http://schemas.microsoft.com/office/mac/drawingml/2011/main" val="1"/>
             </a:ext>
           </a:extLst>
         </p:spPr>
@@ -4889,7 +4894,7 @@
           </a:ln>
           <a:extLst>
             <a:ext uri="{C572A759-6A51-4108-AA02-DFA0A04FC94B}">
-              <ma14:wrappingTextBoxFlag xmlns:ma14="http://schemas.microsoft.com/office/mac/drawingml/2011/main" xmlns="" val="1"/>
+              <ma14:wrappingTextBoxFlag xmlns="" xmlns:ma14="http://schemas.microsoft.com/office/mac/drawingml/2011/main" val="1"/>
             </a:ext>
           </a:extLst>
         </p:spPr>
@@ -5399,7 +5404,7 @@
           </a:ln>
           <a:extLst>
             <a:ext uri="{C572A759-6A51-4108-AA02-DFA0A04FC94B}">
-              <ma14:wrappingTextBoxFlag xmlns:ma14="http://schemas.microsoft.com/office/mac/drawingml/2011/main" xmlns="" val="1"/>
+              <ma14:wrappingTextBoxFlag xmlns="" xmlns:ma14="http://schemas.microsoft.com/office/mac/drawingml/2011/main" val="1"/>
             </a:ext>
           </a:extLst>
         </p:spPr>
@@ -5530,7 +5535,7 @@
           </a:ln>
           <a:extLst>
             <a:ext uri="{C572A759-6A51-4108-AA02-DFA0A04FC94B}">
-              <ma14:wrappingTextBoxFlag xmlns:ma14="http://schemas.microsoft.com/office/mac/drawingml/2011/main" xmlns="" val="1"/>
+              <ma14:wrappingTextBoxFlag xmlns="" xmlns:ma14="http://schemas.microsoft.com/office/mac/drawingml/2011/main" val="1"/>
             </a:ext>
           </a:extLst>
         </p:spPr>
@@ -5698,7 +5703,7 @@
           </a:ln>
           <a:extLst>
             <a:ext uri="{C572A759-6A51-4108-AA02-DFA0A04FC94B}">
-              <ma14:wrappingTextBoxFlag xmlns:ma14="http://schemas.microsoft.com/office/mac/drawingml/2011/main" xmlns="" val="1"/>
+              <ma14:wrappingTextBoxFlag xmlns="" xmlns:ma14="http://schemas.microsoft.com/office/mac/drawingml/2011/main" val="1"/>
             </a:ext>
           </a:extLst>
         </p:spPr>
@@ -5789,7 +5794,7 @@
           </a:ln>
           <a:extLst>
             <a:ext uri="{C572A759-6A51-4108-AA02-DFA0A04FC94B}">
-              <ma14:wrappingTextBoxFlag xmlns:ma14="http://schemas.microsoft.com/office/mac/drawingml/2011/main" xmlns="" val="1"/>
+              <ma14:wrappingTextBoxFlag xmlns="" xmlns:ma14="http://schemas.microsoft.com/office/mac/drawingml/2011/main" val="1"/>
             </a:ext>
           </a:extLst>
         </p:spPr>
@@ -6037,7 +6042,7 @@
           </a:ln>
           <a:extLst>
             <a:ext uri="{C572A759-6A51-4108-AA02-DFA0A04FC94B}">
-              <ma14:wrappingTextBoxFlag xmlns:ma14="http://schemas.microsoft.com/office/mac/drawingml/2011/main" xmlns="" val="1"/>
+              <ma14:wrappingTextBoxFlag xmlns="" xmlns:ma14="http://schemas.microsoft.com/office/mac/drawingml/2011/main" val="1"/>
             </a:ext>
           </a:extLst>
         </p:spPr>
@@ -6159,7 +6164,7 @@
           </a:ln>
           <a:extLst>
             <a:ext uri="{C572A759-6A51-4108-AA02-DFA0A04FC94B}">
-              <ma14:wrappingTextBoxFlag xmlns:ma14="http://schemas.microsoft.com/office/mac/drawingml/2011/main" xmlns="" val="1"/>
+              <ma14:wrappingTextBoxFlag xmlns="" xmlns:ma14="http://schemas.microsoft.com/office/mac/drawingml/2011/main" val="1"/>
             </a:ext>
           </a:extLst>
         </p:spPr>
@@ -6346,7 +6351,7 @@
           </a:ln>
           <a:extLst>
             <a:ext uri="{C572A759-6A51-4108-AA02-DFA0A04FC94B}">
-              <ma14:wrappingTextBoxFlag xmlns:ma14="http://schemas.microsoft.com/office/mac/drawingml/2011/main" xmlns="" val="1"/>
+              <ma14:wrappingTextBoxFlag xmlns="" xmlns:ma14="http://schemas.microsoft.com/office/mac/drawingml/2011/main" val="1"/>
             </a:ext>
           </a:extLst>
         </p:spPr>
@@ -6393,7 +6398,7 @@
           </a:ln>
           <a:extLst>
             <a:ext uri="{C572A759-6A51-4108-AA02-DFA0A04FC94B}">
-              <ma14:wrappingTextBoxFlag xmlns:ma14="http://schemas.microsoft.com/office/mac/drawingml/2011/main" xmlns="" val="1"/>
+              <ma14:wrappingTextBoxFlag xmlns="" xmlns:ma14="http://schemas.microsoft.com/office/mac/drawingml/2011/main" val="1"/>
             </a:ext>
           </a:extLst>
         </p:spPr>
@@ -6440,7 +6445,7 @@
           </a:ln>
           <a:extLst>
             <a:ext uri="{C572A759-6A51-4108-AA02-DFA0A04FC94B}">
-              <ma14:wrappingTextBoxFlag xmlns:ma14="http://schemas.microsoft.com/office/mac/drawingml/2011/main" xmlns="" val="1"/>
+              <ma14:wrappingTextBoxFlag xmlns="" xmlns:ma14="http://schemas.microsoft.com/office/mac/drawingml/2011/main" val="1"/>
             </a:ext>
           </a:extLst>
         </p:spPr>
@@ -6484,7 +6489,7 @@
           </a:ln>
           <a:extLst>
             <a:ext uri="{C572A759-6A51-4108-AA02-DFA0A04FC94B}">
-              <ma14:wrappingTextBoxFlag xmlns:ma14="http://schemas.microsoft.com/office/mac/drawingml/2011/main" xmlns="" val="1"/>
+              <ma14:wrappingTextBoxFlag xmlns="" xmlns:ma14="http://schemas.microsoft.com/office/mac/drawingml/2011/main" val="1"/>
             </a:ext>
           </a:extLst>
         </p:spPr>
@@ -6504,6 +6509,7 @@
           </a:lstStyle>
           <a:p>
             <a:r>
+              <a:rPr dirty="0"/>
               <a:t>Opening Tag</a:t>
             </a:r>
           </a:p>
@@ -6528,7 +6534,7 @@
           </a:ln>
           <a:extLst>
             <a:ext uri="{C572A759-6A51-4108-AA02-DFA0A04FC94B}">
-              <ma14:wrappingTextBoxFlag xmlns:ma14="http://schemas.microsoft.com/office/mac/drawingml/2011/main" xmlns="" val="1"/>
+              <ma14:wrappingTextBoxFlag xmlns="" xmlns:ma14="http://schemas.microsoft.com/office/mac/drawingml/2011/main" val="1"/>
             </a:ext>
           </a:extLst>
         </p:spPr>
@@ -6572,7 +6578,7 @@
           </a:ln>
           <a:extLst>
             <a:ext uri="{C572A759-6A51-4108-AA02-DFA0A04FC94B}">
-              <ma14:wrappingTextBoxFlag xmlns:ma14="http://schemas.microsoft.com/office/mac/drawingml/2011/main" xmlns="" val="1"/>
+              <ma14:wrappingTextBoxFlag xmlns="" xmlns:ma14="http://schemas.microsoft.com/office/mac/drawingml/2011/main" val="1"/>
             </a:ext>
           </a:extLst>
         </p:spPr>
@@ -7024,7 +7030,7 @@
           </a:ln>
           <a:extLst>
             <a:ext uri="{C572A759-6A51-4108-AA02-DFA0A04FC94B}">
-              <ma14:wrappingTextBoxFlag xmlns:ma14="http://schemas.microsoft.com/office/mac/drawingml/2011/main" xmlns="" val="1"/>
+              <ma14:wrappingTextBoxFlag xmlns="" xmlns:ma14="http://schemas.microsoft.com/office/mac/drawingml/2011/main" val="1"/>
             </a:ext>
           </a:extLst>
         </p:spPr>
@@ -7049,9 +7055,10 @@
               </a:defRPr>
             </a:pPr>
             <a:r>
+              <a:rPr dirty="0"/>
               <a:t>Headings:</a:t>
             </a:r>
-            <a:endParaRPr sz="2000"/>
+            <a:endParaRPr sz="2000" dirty="0"/>
           </a:p>
           <a:p>
             <a:pPr marL="257175" indent="-257175" defTabSz="685800">
@@ -7072,13 +7079,14 @@
               </a:defRPr>
             </a:pPr>
             <a:r>
+              <a:rPr dirty="0"/>
               <a:t>&lt;h1&gt; &lt;/h1&gt; </a:t>
             </a:r>
             <a:r>
-              <a:rPr b="0"/>
+              <a:rPr b="0" dirty="0"/>
               <a:t>- Heading 1 (Largest Heading)</a:t>
             </a:r>
-            <a:endParaRPr sz="2000"/>
+            <a:endParaRPr sz="2000" dirty="0"/>
           </a:p>
           <a:p>
             <a:pPr marL="257175" indent="-257175" defTabSz="685800">
@@ -7099,13 +7107,14 @@
               </a:defRPr>
             </a:pPr>
             <a:r>
+              <a:rPr dirty="0"/>
               <a:t>&lt;h2&gt; &lt;/h2&gt; </a:t>
             </a:r>
             <a:r>
-              <a:rPr b="0"/>
+              <a:rPr b="0" dirty="0"/>
               <a:t>- Heading 2 (Next Largest Heading)</a:t>
             </a:r>
-            <a:endParaRPr sz="2000"/>
+            <a:endParaRPr sz="2000" dirty="0"/>
           </a:p>
           <a:p>
             <a:pPr marL="257175" indent="-257175" defTabSz="685800">
@@ -7126,13 +7135,14 @@
               </a:defRPr>
             </a:pPr>
             <a:r>
+              <a:rPr dirty="0"/>
               <a:t>&lt;h3&gt; &lt;/h3&gt; </a:t>
             </a:r>
             <a:r>
-              <a:rPr b="0"/>
+              <a:rPr b="0" dirty="0"/>
               <a:t>- Heading 3 </a:t>
             </a:r>
-            <a:endParaRPr sz="2000"/>
+            <a:endParaRPr sz="2000" dirty="0"/>
           </a:p>
           <a:p>
             <a:pPr marL="257175" indent="-257175" defTabSz="685800">
@@ -7153,9 +7163,10 @@
               </a:defRPr>
             </a:pPr>
             <a:r>
+              <a:rPr dirty="0"/>
               <a:t>…</a:t>
             </a:r>
-            <a:endParaRPr sz="2000"/>
+            <a:endParaRPr sz="2000" dirty="0"/>
           </a:p>
           <a:p>
             <a:pPr defTabSz="685800">
@@ -7172,7 +7183,7 @@
                 <a:sym typeface="Arial"/>
               </a:defRPr>
             </a:pPr>
-            <a:endParaRPr sz="2000"/>
+            <a:endParaRPr sz="2000" dirty="0"/>
           </a:p>
           <a:p>
             <a:pPr defTabSz="685800">
@@ -7190,9 +7201,10 @@
               </a:defRPr>
             </a:pPr>
             <a:r>
+              <a:rPr dirty="0"/>
               <a:t>Containers:</a:t>
             </a:r>
-            <a:endParaRPr sz="2000"/>
+            <a:endParaRPr sz="2000" dirty="0"/>
           </a:p>
           <a:p>
             <a:pPr marL="257175" indent="-257175" defTabSz="685800">
@@ -7213,13 +7225,14 @@
               </a:defRPr>
             </a:pPr>
             <a:r>
+              <a:rPr dirty="0"/>
               <a:t>&lt;html&gt; &lt;/html&gt; </a:t>
             </a:r>
             <a:r>
-              <a:rPr b="0"/>
+              <a:rPr b="0" dirty="0"/>
               <a:t>- Wraps the entire page</a:t>
             </a:r>
-            <a:endParaRPr sz="2000"/>
+            <a:endParaRPr sz="2000" dirty="0"/>
           </a:p>
           <a:p>
             <a:pPr marL="257175" indent="-257175" defTabSz="685800">
@@ -7240,13 +7253,14 @@
               </a:defRPr>
             </a:pPr>
             <a:r>
+              <a:rPr dirty="0"/>
               <a:t>&lt;head&gt; &lt;/head&gt;</a:t>
             </a:r>
             <a:r>
-              <a:rPr b="0"/>
+              <a:rPr b="0" dirty="0"/>
               <a:t> - Wraps the header of the page</a:t>
             </a:r>
-            <a:endParaRPr sz="2000"/>
+            <a:endParaRPr sz="2000" dirty="0"/>
           </a:p>
           <a:p>
             <a:pPr marL="257175" indent="-257175" defTabSz="685800">
@@ -7267,13 +7281,14 @@
               </a:defRPr>
             </a:pPr>
             <a:r>
+              <a:rPr dirty="0"/>
               <a:t>&lt;body&gt; &lt;/body&gt; </a:t>
             </a:r>
             <a:r>
-              <a:rPr b="0"/>
+              <a:rPr b="0" dirty="0"/>
               <a:t>- Wraps the main content </a:t>
             </a:r>
-            <a:endParaRPr sz="2000"/>
+            <a:endParaRPr sz="2000" dirty="0"/>
           </a:p>
           <a:p>
             <a:pPr marL="257175" indent="-257175" defTabSz="685800">
@@ -7294,13 +7309,14 @@
               </a:defRPr>
             </a:pPr>
             <a:r>
+              <a:rPr dirty="0"/>
               <a:t>&lt;div&gt; &lt;/div&gt; </a:t>
             </a:r>
             <a:r>
-              <a:rPr b="0"/>
+              <a:rPr b="0" dirty="0"/>
               <a:t>- Logical Container *** </a:t>
             </a:r>
-            <a:endParaRPr sz="2000"/>
+            <a:endParaRPr sz="2000" dirty="0"/>
           </a:p>
           <a:p>
             <a:pPr marL="257175" indent="-257175" defTabSz="685800">
@@ -7321,13 +7337,14 @@
               </a:defRPr>
             </a:pPr>
             <a:r>
+              <a:rPr dirty="0"/>
               <a:t>&lt;p&gt; &lt;/p&gt; </a:t>
             </a:r>
             <a:r>
-              <a:rPr b="0"/>
+              <a:rPr b="0" dirty="0"/>
               <a:t>- Wraps individual Paragraphs </a:t>
             </a:r>
-            <a:endParaRPr sz="2000"/>
+            <a:endParaRPr sz="2000" dirty="0"/>
           </a:p>
           <a:p>
             <a:pPr marL="257175" indent="-257175" defTabSz="685800">
@@ -7347,7 +7364,7 @@
                 <a:sym typeface="Arial"/>
               </a:defRPr>
             </a:pPr>
-            <a:endParaRPr sz="2000"/>
+            <a:endParaRPr sz="2000" dirty="0"/>
           </a:p>
           <a:p>
             <a:pPr defTabSz="685800">
@@ -7365,9 +7382,10 @@
               </a:defRPr>
             </a:pPr>
             <a:r>
+              <a:rPr dirty="0"/>
               <a:t>Others:</a:t>
             </a:r>
-            <a:endParaRPr sz="2000"/>
+            <a:endParaRPr sz="2000" dirty="0"/>
           </a:p>
           <a:p>
             <a:pPr marL="257175" indent="-257175" defTabSz="685800">
@@ -7388,20 +7406,30 @@
               </a:defRPr>
             </a:pPr>
             <a:r>
+              <a:rPr dirty="0"/>
               <a:t>&lt;strong&gt; </a:t>
             </a:r>
             <a:r>
-              <a:rPr b="0"/>
+              <a:rPr b="0" dirty="0"/>
               <a:t>(bold), </a:t>
             </a:r>
             <a:r>
-              <a:t>&lt;em&gt; </a:t>
-            </a:r>
-            <a:r>
-              <a:rPr b="0"/>
+              <a:rPr dirty="0"/>
+              <a:t>&lt;</a:t>
+            </a:r>
+            <a:r>
+              <a:rPr dirty="0" err="1"/>
+              <a:t>em</a:t>
+            </a:r>
+            <a:r>
+              <a:rPr dirty="0"/>
+              <a:t>&gt; </a:t>
+            </a:r>
+            <a:r>
+              <a:rPr b="0" dirty="0"/>
               <a:t>(emphasis)</a:t>
             </a:r>
-            <a:endParaRPr sz="2200"/>
+            <a:endParaRPr sz="2200" dirty="0"/>
           </a:p>
           <a:p>
             <a:pPr marL="257175" indent="-257175" defTabSz="685800">
@@ -7422,55 +7450,86 @@
               </a:defRPr>
             </a:pPr>
             <a:r>
-              <a:t>&lt;img&gt; </a:t>
-            </a:r>
-            <a:r>
-              <a:rPr b="0"/>
+              <a:rPr dirty="0"/>
+              <a:t>&lt;</a:t>
+            </a:r>
+            <a:r>
+              <a:rPr dirty="0" err="1"/>
+              <a:t>img</a:t>
+            </a:r>
+            <a:r>
+              <a:rPr dirty="0"/>
+              <a:t>&gt; </a:t>
+            </a:r>
+            <a:r>
+              <a:rPr b="0" dirty="0"/>
               <a:t>(images)</a:t>
             </a:r>
             <a:r>
-              <a:t>, &lt;a href&gt; </a:t>
-            </a:r>
-            <a:r>
-              <a:rPr b="0"/>
+              <a:rPr dirty="0"/>
+              <a:t>, &lt;a </a:t>
+            </a:r>
+            <a:r>
+              <a:rPr dirty="0" err="1"/>
+              <a:t>href</a:t>
+            </a:r>
+            <a:r>
+              <a:rPr dirty="0"/>
+              <a:t>&gt; </a:t>
+            </a:r>
+            <a:r>
+              <a:rPr b="0" dirty="0"/>
               <a:t>(links)</a:t>
             </a:r>
             <a:r>
+              <a:rPr dirty="0"/>
               <a:t>, &lt;li&gt; </a:t>
             </a:r>
             <a:r>
-              <a:rPr b="0"/>
+              <a:rPr b="0" dirty="0"/>
               <a:t>(list items)</a:t>
             </a:r>
             <a:r>
+              <a:rPr dirty="0"/>
               <a:t> , &lt;title&gt;</a:t>
             </a:r>
             <a:r>
-              <a:rPr b="0"/>
+              <a:rPr b="0" dirty="0"/>
               <a:t> (title), </a:t>
             </a:r>
             <a:br>
-              <a:rPr b="0"/>
+              <a:rPr b="0" dirty="0"/>
             </a:br>
             <a:r>
-              <a:t>&lt;br&gt;</a:t>
-            </a:r>
-            <a:r>
-              <a:rPr b="0"/>
+              <a:rPr dirty="0"/>
+              <a:t>&lt;</a:t>
+            </a:r>
+            <a:r>
+              <a:rPr dirty="0" err="1"/>
+              <a:t>br</a:t>
+            </a:r>
+            <a:r>
+              <a:rPr dirty="0"/>
+              <a:t>&gt;</a:t>
+            </a:r>
+            <a:r>
+              <a:rPr b="0" dirty="0"/>
               <a:t> (line break), </a:t>
             </a:r>
             <a:r>
+              <a:rPr dirty="0"/>
               <a:t>&lt;table&gt; </a:t>
             </a:r>
             <a:r>
-              <a:rPr b="0"/>
+              <a:rPr b="0" dirty="0"/>
               <a:t>(tables), </a:t>
             </a:r>
             <a:r>
+              <a:rPr dirty="0"/>
               <a:t>&lt;!-- --&gt;</a:t>
             </a:r>
             <a:r>
-              <a:rPr b="0"/>
+              <a:rPr b="0" dirty="0"/>
               <a:t> (comments)</a:t>
             </a:r>
           </a:p>
@@ -7561,7 +7620,7 @@
           </a:ln>
           <a:extLst>
             <a:ext uri="{C572A759-6A51-4108-AA02-DFA0A04FC94B}">
-              <ma14:wrappingTextBoxFlag xmlns:ma14="http://schemas.microsoft.com/office/mac/drawingml/2011/main" xmlns="" val="1"/>
+              <ma14:wrappingTextBoxFlag xmlns="" xmlns:ma14="http://schemas.microsoft.com/office/mac/drawingml/2011/main" val="1"/>
             </a:ext>
           </a:extLst>
         </p:spPr>
@@ -7911,7 +7970,7 @@
           </a:ln>
           <a:extLst>
             <a:ext uri="{C572A759-6A51-4108-AA02-DFA0A04FC94B}">
-              <ma14:wrappingTextBoxFlag xmlns:ma14="http://schemas.microsoft.com/office/mac/drawingml/2011/main" xmlns="" val="1"/>
+              <ma14:wrappingTextBoxFlag xmlns="" xmlns:ma14="http://schemas.microsoft.com/office/mac/drawingml/2011/main" val="1"/>
             </a:ext>
           </a:extLst>
         </p:spPr>

</xml_diff>